<commit_message>
FDS Tech Ref Guide : Add some figs for unstructured geometry chapter.
</commit_message>
<xml_diff>
--- a/fds/Geometry_Figures/CutCellsBCSketch.pptx
+++ b/fds/Geometry_Figures/CutCellsBCSketch.pptx
@@ -104,6 +104,22 @@
       </a:defRPr>
     </a:lvl9pPr>
   </p:defaultTextStyle>
+  <p:extLst>
+    <p:ext uri="{EFAFB233-063F-42B5-8137-9DF3F51BA10A}">
+      <p15:sldGuideLst xmlns:p15="http://schemas.microsoft.com/office/powerpoint/2012/main">
+        <p15:guide id="1" orient="horz" pos="2160">
+          <p15:clr>
+            <a:srgbClr val="A4A3A4"/>
+          </p15:clr>
+        </p15:guide>
+        <p15:guide id="2" pos="2880">
+          <p15:clr>
+            <a:srgbClr val="A4A3A4"/>
+          </p15:clr>
+        </p15:guide>
+      </p15:sldGuideLst>
+    </p:ext>
+  </p:extLst>
 </p:presentation>
 </file>
 
@@ -145,10 +161,9 @@
           <a:lstStyle/>
           <a:p>
             <a:r>
-              <a:rPr lang="en-US" smtClean="0"/>
+              <a:rPr lang="en-US"/>
               <a:t>Click to edit Master title style</a:t>
             </a:r>
-            <a:endParaRPr lang="en-US"/>
           </a:p>
         </p:txBody>
       </p:sp>
@@ -264,10 +279,9 @@
           </a:lstStyle>
           <a:p>
             <a:r>
-              <a:rPr lang="en-US" smtClean="0"/>
+              <a:rPr lang="en-US"/>
               <a:t>Click to edit Master subtitle style</a:t>
             </a:r>
-            <a:endParaRPr lang="en-US"/>
           </a:p>
         </p:txBody>
       </p:sp>
@@ -288,7 +302,7 @@
           <a:p>
             <a:fld id="{494A5700-4F78-D245-AE2B-234359B87ED0}" type="datetimeFigureOut">
               <a:rPr lang="en-US" smtClean="0"/>
-              <a:t>11/19/14</a:t>
+              <a:t>4/7/21</a:t>
             </a:fld>
             <a:endParaRPr lang="en-US"/>
           </a:p>
@@ -382,10 +396,9 @@
           <a:lstStyle/>
           <a:p>
             <a:r>
-              <a:rPr lang="en-US" smtClean="0"/>
+              <a:rPr lang="en-US"/>
               <a:t>Click to edit Master title style</a:t>
             </a:r>
-            <a:endParaRPr lang="en-US"/>
           </a:p>
         </p:txBody>
       </p:sp>
@@ -406,38 +419,37 @@
           <a:p>
             <a:pPr lvl="0"/>
             <a:r>
-              <a:rPr lang="en-US" smtClean="0"/>
+              <a:rPr lang="en-US"/>
               <a:t>Click to edit Master text styles</a:t>
             </a:r>
           </a:p>
           <a:p>
             <a:pPr lvl="1"/>
             <a:r>
-              <a:rPr lang="en-US" smtClean="0"/>
+              <a:rPr lang="en-US"/>
               <a:t>Second level</a:t>
             </a:r>
           </a:p>
           <a:p>
             <a:pPr lvl="2"/>
             <a:r>
-              <a:rPr lang="en-US" smtClean="0"/>
+              <a:rPr lang="en-US"/>
               <a:t>Third level</a:t>
             </a:r>
           </a:p>
           <a:p>
             <a:pPr lvl="3"/>
             <a:r>
-              <a:rPr lang="en-US" smtClean="0"/>
+              <a:rPr lang="en-US"/>
               <a:t>Fourth level</a:t>
             </a:r>
           </a:p>
           <a:p>
             <a:pPr lvl="4"/>
             <a:r>
-              <a:rPr lang="en-US" smtClean="0"/>
+              <a:rPr lang="en-US"/>
               <a:t>Fifth level</a:t>
             </a:r>
-            <a:endParaRPr lang="en-US"/>
           </a:p>
         </p:txBody>
       </p:sp>
@@ -458,7 +470,7 @@
           <a:p>
             <a:fld id="{494A5700-4F78-D245-AE2B-234359B87ED0}" type="datetimeFigureOut">
               <a:rPr lang="en-US" smtClean="0"/>
-              <a:t>11/19/14</a:t>
+              <a:t>4/7/21</a:t>
             </a:fld>
             <a:endParaRPr lang="en-US"/>
           </a:p>
@@ -557,10 +569,9 @@
           <a:lstStyle/>
           <a:p>
             <a:r>
-              <a:rPr lang="en-US" smtClean="0"/>
+              <a:rPr lang="en-US"/>
               <a:t>Click to edit Master title style</a:t>
             </a:r>
-            <a:endParaRPr lang="en-US"/>
           </a:p>
         </p:txBody>
       </p:sp>
@@ -586,38 +597,37 @@
           <a:p>
             <a:pPr lvl="0"/>
             <a:r>
-              <a:rPr lang="en-US" smtClean="0"/>
+              <a:rPr lang="en-US"/>
               <a:t>Click to edit Master text styles</a:t>
             </a:r>
           </a:p>
           <a:p>
             <a:pPr lvl="1"/>
             <a:r>
-              <a:rPr lang="en-US" smtClean="0"/>
+              <a:rPr lang="en-US"/>
               <a:t>Second level</a:t>
             </a:r>
           </a:p>
           <a:p>
             <a:pPr lvl="2"/>
             <a:r>
-              <a:rPr lang="en-US" smtClean="0"/>
+              <a:rPr lang="en-US"/>
               <a:t>Third level</a:t>
             </a:r>
           </a:p>
           <a:p>
             <a:pPr lvl="3"/>
             <a:r>
-              <a:rPr lang="en-US" smtClean="0"/>
+              <a:rPr lang="en-US"/>
               <a:t>Fourth level</a:t>
             </a:r>
           </a:p>
           <a:p>
             <a:pPr lvl="4"/>
             <a:r>
-              <a:rPr lang="en-US" smtClean="0"/>
+              <a:rPr lang="en-US"/>
               <a:t>Fifth level</a:t>
             </a:r>
-            <a:endParaRPr lang="en-US"/>
           </a:p>
         </p:txBody>
       </p:sp>
@@ -638,7 +648,7 @@
           <a:p>
             <a:fld id="{494A5700-4F78-D245-AE2B-234359B87ED0}" type="datetimeFigureOut">
               <a:rPr lang="en-US" smtClean="0"/>
-              <a:t>11/19/14</a:t>
+              <a:t>4/7/21</a:t>
             </a:fld>
             <a:endParaRPr lang="en-US"/>
           </a:p>
@@ -732,10 +742,9 @@
           <a:lstStyle/>
           <a:p>
             <a:r>
-              <a:rPr lang="en-US" smtClean="0"/>
+              <a:rPr lang="en-US"/>
               <a:t>Click to edit Master title style</a:t>
             </a:r>
-            <a:endParaRPr lang="en-US"/>
           </a:p>
         </p:txBody>
       </p:sp>
@@ -756,38 +765,37 @@
           <a:p>
             <a:pPr lvl="0"/>
             <a:r>
-              <a:rPr lang="en-US" smtClean="0"/>
+              <a:rPr lang="en-US"/>
               <a:t>Click to edit Master text styles</a:t>
             </a:r>
           </a:p>
           <a:p>
             <a:pPr lvl="1"/>
             <a:r>
-              <a:rPr lang="en-US" smtClean="0"/>
+              <a:rPr lang="en-US"/>
               <a:t>Second level</a:t>
             </a:r>
           </a:p>
           <a:p>
             <a:pPr lvl="2"/>
             <a:r>
-              <a:rPr lang="en-US" smtClean="0"/>
+              <a:rPr lang="en-US"/>
               <a:t>Third level</a:t>
             </a:r>
           </a:p>
           <a:p>
             <a:pPr lvl="3"/>
             <a:r>
-              <a:rPr lang="en-US" smtClean="0"/>
+              <a:rPr lang="en-US"/>
               <a:t>Fourth level</a:t>
             </a:r>
           </a:p>
           <a:p>
             <a:pPr lvl="4"/>
             <a:r>
-              <a:rPr lang="en-US" smtClean="0"/>
+              <a:rPr lang="en-US"/>
               <a:t>Fifth level</a:t>
             </a:r>
-            <a:endParaRPr lang="en-US"/>
           </a:p>
         </p:txBody>
       </p:sp>
@@ -808,7 +816,7 @@
           <a:p>
             <a:fld id="{494A5700-4F78-D245-AE2B-234359B87ED0}" type="datetimeFigureOut">
               <a:rPr lang="en-US" smtClean="0"/>
-              <a:t>11/19/14</a:t>
+              <a:t>4/7/21</a:t>
             </a:fld>
             <a:endParaRPr lang="en-US"/>
           </a:p>
@@ -911,10 +919,9 @@
           </a:lstStyle>
           <a:p>
             <a:r>
-              <a:rPr lang="en-US" smtClean="0"/>
+              <a:rPr lang="en-US"/>
               <a:t>Click to edit Master title style</a:t>
             </a:r>
-            <a:endParaRPr lang="en-US"/>
           </a:p>
         </p:txBody>
       </p:sp>
@@ -1031,7 +1038,7 @@
           <a:p>
             <a:pPr lvl="0"/>
             <a:r>
-              <a:rPr lang="en-US" smtClean="0"/>
+              <a:rPr lang="en-US"/>
               <a:t>Click to edit Master text styles</a:t>
             </a:r>
           </a:p>
@@ -1054,7 +1061,7 @@
           <a:p>
             <a:fld id="{494A5700-4F78-D245-AE2B-234359B87ED0}" type="datetimeFigureOut">
               <a:rPr lang="en-US" smtClean="0"/>
-              <a:t>11/19/14</a:t>
+              <a:t>4/7/21</a:t>
             </a:fld>
             <a:endParaRPr lang="en-US"/>
           </a:p>
@@ -1148,10 +1155,9 @@
           <a:lstStyle/>
           <a:p>
             <a:r>
-              <a:rPr lang="en-US" smtClean="0"/>
+              <a:rPr lang="en-US"/>
               <a:t>Click to edit Master title style</a:t>
             </a:r>
-            <a:endParaRPr lang="en-US"/>
           </a:p>
         </p:txBody>
       </p:sp>
@@ -1205,38 +1211,37 @@
           <a:p>
             <a:pPr lvl="0"/>
             <a:r>
-              <a:rPr lang="en-US" smtClean="0"/>
+              <a:rPr lang="en-US"/>
               <a:t>Click to edit Master text styles</a:t>
             </a:r>
           </a:p>
           <a:p>
             <a:pPr lvl="1"/>
             <a:r>
-              <a:rPr lang="en-US" smtClean="0"/>
+              <a:rPr lang="en-US"/>
               <a:t>Second level</a:t>
             </a:r>
           </a:p>
           <a:p>
             <a:pPr lvl="2"/>
             <a:r>
-              <a:rPr lang="en-US" smtClean="0"/>
+              <a:rPr lang="en-US"/>
               <a:t>Third level</a:t>
             </a:r>
           </a:p>
           <a:p>
             <a:pPr lvl="3"/>
             <a:r>
-              <a:rPr lang="en-US" smtClean="0"/>
+              <a:rPr lang="en-US"/>
               <a:t>Fourth level</a:t>
             </a:r>
           </a:p>
           <a:p>
             <a:pPr lvl="4"/>
             <a:r>
-              <a:rPr lang="en-US" smtClean="0"/>
+              <a:rPr lang="en-US"/>
               <a:t>Fifth level</a:t>
             </a:r>
-            <a:endParaRPr lang="en-US"/>
           </a:p>
         </p:txBody>
       </p:sp>
@@ -1290,38 +1295,37 @@
           <a:p>
             <a:pPr lvl="0"/>
             <a:r>
-              <a:rPr lang="en-US" smtClean="0"/>
+              <a:rPr lang="en-US"/>
               <a:t>Click to edit Master text styles</a:t>
             </a:r>
           </a:p>
           <a:p>
             <a:pPr lvl="1"/>
             <a:r>
-              <a:rPr lang="en-US" smtClean="0"/>
+              <a:rPr lang="en-US"/>
               <a:t>Second level</a:t>
             </a:r>
           </a:p>
           <a:p>
             <a:pPr lvl="2"/>
             <a:r>
-              <a:rPr lang="en-US" smtClean="0"/>
+              <a:rPr lang="en-US"/>
               <a:t>Third level</a:t>
             </a:r>
           </a:p>
           <a:p>
             <a:pPr lvl="3"/>
             <a:r>
-              <a:rPr lang="en-US" smtClean="0"/>
+              <a:rPr lang="en-US"/>
               <a:t>Fourth level</a:t>
             </a:r>
           </a:p>
           <a:p>
             <a:pPr lvl="4"/>
             <a:r>
-              <a:rPr lang="en-US" smtClean="0"/>
+              <a:rPr lang="en-US"/>
               <a:t>Fifth level</a:t>
             </a:r>
-            <a:endParaRPr lang="en-US"/>
           </a:p>
         </p:txBody>
       </p:sp>
@@ -1342,7 +1346,7 @@
           <a:p>
             <a:fld id="{494A5700-4F78-D245-AE2B-234359B87ED0}" type="datetimeFigureOut">
               <a:rPr lang="en-US" smtClean="0"/>
-              <a:t>11/19/14</a:t>
+              <a:t>4/7/21</a:t>
             </a:fld>
             <a:endParaRPr lang="en-US"/>
           </a:p>
@@ -1440,10 +1444,9 @@
           </a:lstStyle>
           <a:p>
             <a:r>
-              <a:rPr lang="en-US" smtClean="0"/>
+              <a:rPr lang="en-US"/>
               <a:t>Click to edit Master title style</a:t>
             </a:r>
-            <a:endParaRPr lang="en-US"/>
           </a:p>
         </p:txBody>
       </p:sp>
@@ -1506,7 +1509,7 @@
           <a:p>
             <a:pPr lvl="0"/>
             <a:r>
-              <a:rPr lang="en-US" smtClean="0"/>
+              <a:rPr lang="en-US"/>
               <a:t>Click to edit Master text styles</a:t>
             </a:r>
           </a:p>
@@ -1562,38 +1565,37 @@
           <a:p>
             <a:pPr lvl="0"/>
             <a:r>
-              <a:rPr lang="en-US" smtClean="0"/>
+              <a:rPr lang="en-US"/>
               <a:t>Click to edit Master text styles</a:t>
             </a:r>
           </a:p>
           <a:p>
             <a:pPr lvl="1"/>
             <a:r>
-              <a:rPr lang="en-US" smtClean="0"/>
+              <a:rPr lang="en-US"/>
               <a:t>Second level</a:t>
             </a:r>
           </a:p>
           <a:p>
             <a:pPr lvl="2"/>
             <a:r>
-              <a:rPr lang="en-US" smtClean="0"/>
+              <a:rPr lang="en-US"/>
               <a:t>Third level</a:t>
             </a:r>
           </a:p>
           <a:p>
             <a:pPr lvl="3"/>
             <a:r>
-              <a:rPr lang="en-US" smtClean="0"/>
+              <a:rPr lang="en-US"/>
               <a:t>Fourth level</a:t>
             </a:r>
           </a:p>
           <a:p>
             <a:pPr lvl="4"/>
             <a:r>
-              <a:rPr lang="en-US" smtClean="0"/>
+              <a:rPr lang="en-US"/>
               <a:t>Fifth level</a:t>
             </a:r>
-            <a:endParaRPr lang="en-US"/>
           </a:p>
         </p:txBody>
       </p:sp>
@@ -1656,7 +1658,7 @@
           <a:p>
             <a:pPr lvl="0"/>
             <a:r>
-              <a:rPr lang="en-US" smtClean="0"/>
+              <a:rPr lang="en-US"/>
               <a:t>Click to edit Master text styles</a:t>
             </a:r>
           </a:p>
@@ -1712,38 +1714,37 @@
           <a:p>
             <a:pPr lvl="0"/>
             <a:r>
-              <a:rPr lang="en-US" smtClean="0"/>
+              <a:rPr lang="en-US"/>
               <a:t>Click to edit Master text styles</a:t>
             </a:r>
           </a:p>
           <a:p>
             <a:pPr lvl="1"/>
             <a:r>
-              <a:rPr lang="en-US" smtClean="0"/>
+              <a:rPr lang="en-US"/>
               <a:t>Second level</a:t>
             </a:r>
           </a:p>
           <a:p>
             <a:pPr lvl="2"/>
             <a:r>
-              <a:rPr lang="en-US" smtClean="0"/>
+              <a:rPr lang="en-US"/>
               <a:t>Third level</a:t>
             </a:r>
           </a:p>
           <a:p>
             <a:pPr lvl="3"/>
             <a:r>
-              <a:rPr lang="en-US" smtClean="0"/>
+              <a:rPr lang="en-US"/>
               <a:t>Fourth level</a:t>
             </a:r>
           </a:p>
           <a:p>
             <a:pPr lvl="4"/>
             <a:r>
-              <a:rPr lang="en-US" smtClean="0"/>
+              <a:rPr lang="en-US"/>
               <a:t>Fifth level</a:t>
             </a:r>
-            <a:endParaRPr lang="en-US"/>
           </a:p>
         </p:txBody>
       </p:sp>
@@ -1764,7 +1765,7 @@
           <a:p>
             <a:fld id="{494A5700-4F78-D245-AE2B-234359B87ED0}" type="datetimeFigureOut">
               <a:rPr lang="en-US" smtClean="0"/>
-              <a:t>11/19/14</a:t>
+              <a:t>4/7/21</a:t>
             </a:fld>
             <a:endParaRPr lang="en-US"/>
           </a:p>
@@ -1858,10 +1859,9 @@
           <a:lstStyle/>
           <a:p>
             <a:r>
-              <a:rPr lang="en-US" smtClean="0"/>
+              <a:rPr lang="en-US"/>
               <a:t>Click to edit Master title style</a:t>
             </a:r>
-            <a:endParaRPr lang="en-US"/>
           </a:p>
         </p:txBody>
       </p:sp>
@@ -1882,7 +1882,7 @@
           <a:p>
             <a:fld id="{494A5700-4F78-D245-AE2B-234359B87ED0}" type="datetimeFigureOut">
               <a:rPr lang="en-US" smtClean="0"/>
-              <a:t>11/19/14</a:t>
+              <a:t>4/7/21</a:t>
             </a:fld>
             <a:endParaRPr lang="en-US"/>
           </a:p>
@@ -1977,7 +1977,7 @@
           <a:p>
             <a:fld id="{494A5700-4F78-D245-AE2B-234359B87ED0}" type="datetimeFigureOut">
               <a:rPr lang="en-US" smtClean="0"/>
-              <a:t>11/19/14</a:t>
+              <a:t>4/7/21</a:t>
             </a:fld>
             <a:endParaRPr lang="en-US"/>
           </a:p>
@@ -2080,10 +2080,9 @@
           </a:lstStyle>
           <a:p>
             <a:r>
-              <a:rPr lang="en-US" smtClean="0"/>
+              <a:rPr lang="en-US"/>
               <a:t>Click to edit Master title style</a:t>
             </a:r>
-            <a:endParaRPr lang="en-US"/>
           </a:p>
         </p:txBody>
       </p:sp>
@@ -2137,38 +2136,37 @@
           <a:p>
             <a:pPr lvl="0"/>
             <a:r>
-              <a:rPr lang="en-US" smtClean="0"/>
+              <a:rPr lang="en-US"/>
               <a:t>Click to edit Master text styles</a:t>
             </a:r>
           </a:p>
           <a:p>
             <a:pPr lvl="1"/>
             <a:r>
-              <a:rPr lang="en-US" smtClean="0"/>
+              <a:rPr lang="en-US"/>
               <a:t>Second level</a:t>
             </a:r>
           </a:p>
           <a:p>
             <a:pPr lvl="2"/>
             <a:r>
-              <a:rPr lang="en-US" smtClean="0"/>
+              <a:rPr lang="en-US"/>
               <a:t>Third level</a:t>
             </a:r>
           </a:p>
           <a:p>
             <a:pPr lvl="3"/>
             <a:r>
-              <a:rPr lang="en-US" smtClean="0"/>
+              <a:rPr lang="en-US"/>
               <a:t>Fourth level</a:t>
             </a:r>
           </a:p>
           <a:p>
             <a:pPr lvl="4"/>
             <a:r>
-              <a:rPr lang="en-US" smtClean="0"/>
+              <a:rPr lang="en-US"/>
               <a:t>Fifth level</a:t>
             </a:r>
-            <a:endParaRPr lang="en-US"/>
           </a:p>
         </p:txBody>
       </p:sp>
@@ -2231,7 +2229,7 @@
           <a:p>
             <a:pPr lvl="0"/>
             <a:r>
-              <a:rPr lang="en-US" smtClean="0"/>
+              <a:rPr lang="en-US"/>
               <a:t>Click to edit Master text styles</a:t>
             </a:r>
           </a:p>
@@ -2254,7 +2252,7 @@
           <a:p>
             <a:fld id="{494A5700-4F78-D245-AE2B-234359B87ED0}" type="datetimeFigureOut">
               <a:rPr lang="en-US" smtClean="0"/>
-              <a:t>11/19/14</a:t>
+              <a:t>4/7/21</a:t>
             </a:fld>
             <a:endParaRPr lang="en-US"/>
           </a:p>
@@ -2357,10 +2355,9 @@
           </a:lstStyle>
           <a:p>
             <a:r>
-              <a:rPr lang="en-US" smtClean="0"/>
+              <a:rPr lang="en-US"/>
               <a:t>Click to edit Master title style</a:t>
             </a:r>
-            <a:endParaRPr lang="en-US"/>
           </a:p>
         </p:txBody>
       </p:sp>
@@ -2484,7 +2481,7 @@
           <a:p>
             <a:pPr lvl="0"/>
             <a:r>
-              <a:rPr lang="en-US" smtClean="0"/>
+              <a:rPr lang="en-US"/>
               <a:t>Click to edit Master text styles</a:t>
             </a:r>
           </a:p>
@@ -2507,7 +2504,7 @@
           <a:p>
             <a:fld id="{494A5700-4F78-D245-AE2B-234359B87ED0}" type="datetimeFigureOut">
               <a:rPr lang="en-US" smtClean="0"/>
-              <a:t>11/19/14</a:t>
+              <a:t>4/7/21</a:t>
             </a:fld>
             <a:endParaRPr lang="en-US"/>
           </a:p>
@@ -2616,10 +2613,9 @@
           <a:lstStyle/>
           <a:p>
             <a:r>
-              <a:rPr lang="en-US" smtClean="0"/>
+              <a:rPr lang="en-US"/>
               <a:t>Click to edit Master title style</a:t>
             </a:r>
-            <a:endParaRPr lang="en-US"/>
           </a:p>
         </p:txBody>
       </p:sp>
@@ -2650,38 +2646,37 @@
           <a:p>
             <a:pPr lvl="0"/>
             <a:r>
-              <a:rPr lang="en-US" smtClean="0"/>
+              <a:rPr lang="en-US"/>
               <a:t>Click to edit Master text styles</a:t>
             </a:r>
           </a:p>
           <a:p>
             <a:pPr lvl="1"/>
             <a:r>
-              <a:rPr lang="en-US" smtClean="0"/>
+              <a:rPr lang="en-US"/>
               <a:t>Second level</a:t>
             </a:r>
           </a:p>
           <a:p>
             <a:pPr lvl="2"/>
             <a:r>
-              <a:rPr lang="en-US" smtClean="0"/>
+              <a:rPr lang="en-US"/>
               <a:t>Third level</a:t>
             </a:r>
           </a:p>
           <a:p>
             <a:pPr lvl="3"/>
             <a:r>
-              <a:rPr lang="en-US" smtClean="0"/>
+              <a:rPr lang="en-US"/>
               <a:t>Fourth level</a:t>
             </a:r>
           </a:p>
           <a:p>
             <a:pPr lvl="4"/>
             <a:r>
-              <a:rPr lang="en-US" smtClean="0"/>
+              <a:rPr lang="en-US"/>
               <a:t>Fifth level</a:t>
             </a:r>
-            <a:endParaRPr lang="en-US"/>
           </a:p>
         </p:txBody>
       </p:sp>
@@ -2720,7 +2715,7 @@
           <a:p>
             <a:fld id="{494A5700-4F78-D245-AE2B-234359B87ED0}" type="datetimeFigureOut">
               <a:rPr lang="en-US" smtClean="0"/>
-              <a:t>11/19/14</a:t>
+              <a:t>4/7/21</a:t>
             </a:fld>
             <a:endParaRPr lang="en-US"/>
           </a:p>
@@ -3109,98 +3104,6 @@
             <a:chExt cx="4673999" cy="3903270"/>
           </a:xfrm>
         </p:grpSpPr>
-        <p:sp>
-          <p:nvSpPr>
-            <p:cNvPr id="164" name="Right Triangle 163"/>
-            <p:cNvSpPr/>
-            <p:nvPr/>
-          </p:nvSpPr>
-          <p:spPr>
-            <a:xfrm rot="10615264">
-              <a:off x="3221563" y="2362199"/>
-              <a:ext cx="948267" cy="533400"/>
-            </a:xfrm>
-            <a:prstGeom prst="rtTriangle">
-              <a:avLst/>
-            </a:prstGeom>
-            <a:solidFill>
-              <a:srgbClr val="FF6600">
-                <a:alpha val="36000"/>
-              </a:srgbClr>
-            </a:solidFill>
-            <a:ln>
-              <a:noFill/>
-            </a:ln>
-          </p:spPr>
-          <p:style>
-            <a:lnRef idx="1">
-              <a:schemeClr val="accent1"/>
-            </a:lnRef>
-            <a:fillRef idx="3">
-              <a:schemeClr val="accent1"/>
-            </a:fillRef>
-            <a:effectRef idx="2">
-              <a:schemeClr val="accent1"/>
-            </a:effectRef>
-            <a:fontRef idx="minor">
-              <a:schemeClr val="lt1"/>
-            </a:fontRef>
-          </p:style>
-          <p:txBody>
-            <a:bodyPr rtlCol="0" anchor="ctr"/>
-            <a:lstStyle/>
-            <a:p>
-              <a:pPr algn="ctr"/>
-              <a:endParaRPr lang="en-US"/>
-            </a:p>
-          </p:txBody>
-        </p:sp>
-        <p:sp>
-          <p:nvSpPr>
-            <p:cNvPr id="165" name="Right Triangle 164"/>
-            <p:cNvSpPr/>
-            <p:nvPr/>
-          </p:nvSpPr>
-          <p:spPr>
-            <a:xfrm rot="10615264" flipH="1">
-              <a:off x="4169284" y="2317882"/>
-              <a:ext cx="784633" cy="575634"/>
-            </a:xfrm>
-            <a:prstGeom prst="rtTriangle">
-              <a:avLst/>
-            </a:prstGeom>
-            <a:solidFill>
-              <a:srgbClr val="FF6600">
-                <a:alpha val="36000"/>
-              </a:srgbClr>
-            </a:solidFill>
-            <a:ln>
-              <a:noFill/>
-            </a:ln>
-          </p:spPr>
-          <p:style>
-            <a:lnRef idx="1">
-              <a:schemeClr val="accent1"/>
-            </a:lnRef>
-            <a:fillRef idx="3">
-              <a:schemeClr val="accent1"/>
-            </a:fillRef>
-            <a:effectRef idx="2">
-              <a:schemeClr val="accent1"/>
-            </a:effectRef>
-            <a:fontRef idx="minor">
-              <a:schemeClr val="lt1"/>
-            </a:fontRef>
-          </p:style>
-          <p:txBody>
-            <a:bodyPr rtlCol="0" anchor="ctr"/>
-            <a:lstStyle/>
-            <a:p>
-              <a:pPr algn="ctr"/>
-              <a:endParaRPr lang="en-US"/>
-            </a:p>
-          </p:txBody>
-        </p:sp>
         <p:cxnSp>
           <p:nvCxnSpPr>
             <p:cNvPr id="88" name="Straight Connector 87"/>
@@ -3258,7 +3161,7 @@
             <a:graphicData uri="http://schemas.openxmlformats.org/presentationml/2006/ole">
               <mc:AlternateContent xmlns:mc="http://schemas.openxmlformats.org/markup-compatibility/2006">
                 <mc:Choice xmlns:v="urn:schemas-microsoft-com:vml" Requires="v">
-                  <p:oleObj spid="_x0000_s1041" name="Equation" r:id="rId3" imgW="203200" imgH="228600" progId="Equation.3">
+                  <p:oleObj spid="_x0000_s1117" name="Equation" r:id="rId3" imgW="203200" imgH="228600" progId="Equation.3">
                     <p:embed/>
                   </p:oleObj>
                 </mc:Choice>
@@ -3447,7 +3350,7 @@
             <a:lstStyle/>
             <a:p>
               <a:pPr algn="ctr"/>
-              <a:endParaRPr lang="en-US">
+              <a:endParaRPr lang="en-US" dirty="0">
                 <a:solidFill>
                   <a:srgbClr val="FF0000"/>
                 </a:solidFill>
@@ -3615,11 +3518,6 @@
                 </a:rPr>
                 <a:t>3</a:t>
               </a:r>
-              <a:endParaRPr lang="en-US" dirty="0">
-                <a:solidFill>
-                  <a:schemeClr val="tx1"/>
-                </a:solidFill>
-              </a:endParaRPr>
             </a:p>
           </p:txBody>
         </p:sp>
@@ -4027,7 +3925,7 @@
             <a:graphicData uri="http://schemas.openxmlformats.org/presentationml/2006/ole">
               <mc:AlternateContent xmlns:mc="http://schemas.openxmlformats.org/markup-compatibility/2006">
                 <mc:Choice xmlns:v="urn:schemas-microsoft-com:vml" Requires="v">
-                  <p:oleObj spid="_x0000_s1042" name="Equation" r:id="rId5" imgW="177800" imgH="215900" progId="Equation.3">
+                  <p:oleObj spid="_x0000_s1118" name="Equation" r:id="rId5" imgW="177800" imgH="215900" progId="Equation.3">
                     <p:embed/>
                   </p:oleObj>
                 </mc:Choice>
@@ -4169,7 +4067,7 @@
             <a:graphicData uri="http://schemas.openxmlformats.org/presentationml/2006/ole">
               <mc:AlternateContent xmlns:mc="http://schemas.openxmlformats.org/markup-compatibility/2006">
                 <mc:Choice xmlns:v="urn:schemas-microsoft-com:vml" Requires="v">
-                  <p:oleObj spid="_x0000_s1043" name="Equation" r:id="rId7" imgW="254000" imgH="228600" progId="Equation.3">
+                  <p:oleObj spid="_x0000_s1119" name="Equation" r:id="rId7" imgW="254000" imgH="228600" progId="Equation.3">
                     <p:embed/>
                   </p:oleObj>
                 </mc:Choice>
@@ -4263,7 +4161,7 @@
             <a:graphicData uri="http://schemas.openxmlformats.org/presentationml/2006/ole">
               <mc:AlternateContent xmlns:mc="http://schemas.openxmlformats.org/markup-compatibility/2006">
                 <mc:Choice xmlns:v="urn:schemas-microsoft-com:vml" Requires="v">
-                  <p:oleObj spid="_x0000_s1044" name="Equation" r:id="rId9" imgW="266700" imgH="241300" progId="Equation.3">
+                  <p:oleObj spid="_x0000_s1120" name="Equation" r:id="rId9" imgW="266700" imgH="241300" progId="Equation.3">
                     <p:embed/>
                   </p:oleObj>
                 </mc:Choice>
@@ -4362,7 +4260,7 @@
             <a:graphicData uri="http://schemas.openxmlformats.org/presentationml/2006/ole">
               <mc:AlternateContent xmlns:mc="http://schemas.openxmlformats.org/markup-compatibility/2006">
                 <mc:Choice xmlns:v="urn:schemas-microsoft-com:vml" Requires="v">
-                  <p:oleObj spid="_x0000_s1045" name="Equation" r:id="rId11" imgW="190500" imgH="228600" progId="Equation.3">
+                  <p:oleObj spid="_x0000_s1121" name="Equation" r:id="rId11" imgW="190500" imgH="228600" progId="Equation.3">
                     <p:embed/>
                   </p:oleObj>
                 </mc:Choice>
@@ -4469,7 +4367,7 @@
             <a:graphicData uri="http://schemas.openxmlformats.org/presentationml/2006/ole">
               <mc:AlternateContent xmlns:mc="http://schemas.openxmlformats.org/markup-compatibility/2006">
                 <mc:Choice xmlns:v="urn:schemas-microsoft-com:vml" Requires="v">
-                  <p:oleObj spid="_x0000_s1046" name="Equation" r:id="rId13" imgW="215900" imgH="215900" progId="Equation.3">
+                  <p:oleObj spid="_x0000_s1122" name="Equation" r:id="rId13" imgW="215900" imgH="215900" progId="Equation.3">
                     <p:embed/>
                   </p:oleObj>
                 </mc:Choice>
@@ -4562,7 +4460,7 @@
             <a:graphicData uri="http://schemas.openxmlformats.org/presentationml/2006/ole">
               <mc:AlternateContent xmlns:mc="http://schemas.openxmlformats.org/markup-compatibility/2006">
                 <mc:Choice xmlns:v="urn:schemas-microsoft-com:vml" Requires="v">
-                  <p:oleObj spid="_x0000_s1047" name="Equation" r:id="rId15" imgW="101600" imgH="203200" progId="Equation.3">
+                  <p:oleObj spid="_x0000_s1123" name="Equation" r:id="rId15" imgW="101600" imgH="203200" progId="Equation.3">
                     <p:embed/>
                   </p:oleObj>
                 </mc:Choice>
@@ -4655,7 +4553,7 @@
             <a:graphicData uri="http://schemas.openxmlformats.org/presentationml/2006/ole">
               <mc:AlternateContent xmlns:mc="http://schemas.openxmlformats.org/markup-compatibility/2006">
                 <mc:Choice xmlns:v="urn:schemas-microsoft-com:vml" Requires="v">
-                  <p:oleObj spid="_x0000_s1048" name="Equation" r:id="rId17" imgW="101600" imgH="241300" progId="Equation.3">
+                  <p:oleObj spid="_x0000_s1124" name="Equation" r:id="rId17" imgW="101600" imgH="241300" progId="Equation.3">
                     <p:embed/>
                   </p:oleObj>
                 </mc:Choice>
@@ -4698,7 +4596,7 @@
           </p:nvSpPr>
           <p:spPr>
             <a:xfrm>
-              <a:off x="3904857" y="2502303"/>
+              <a:off x="3378634" y="2198126"/>
               <a:ext cx="231414" cy="226944"/>
             </a:xfrm>
             <a:prstGeom prst="ellipse">
@@ -4731,18 +4629,13 @@
             <a:p>
               <a:pPr algn="ctr"/>
               <a:r>
-                <a:rPr lang="en-US" dirty="0" smtClean="0">
+                <a:rPr lang="en-US" dirty="0">
                   <a:solidFill>
                     <a:schemeClr val="tx1"/>
                   </a:solidFill>
                 </a:rPr>
                 <a:t>1</a:t>
               </a:r>
-              <a:endParaRPr lang="en-US" dirty="0">
-                <a:solidFill>
-                  <a:schemeClr val="tx1"/>
-                </a:solidFill>
-              </a:endParaRPr>
             </a:p>
           </p:txBody>
         </p:sp>
@@ -4818,7 +4711,7 @@
             <a:graphicData uri="http://schemas.openxmlformats.org/presentationml/2006/ole">
               <mc:AlternateContent xmlns:mc="http://schemas.openxmlformats.org/markup-compatibility/2006">
                 <mc:Choice xmlns:v="urn:schemas-microsoft-com:vml" Requires="v">
-                  <p:oleObj spid="_x0000_s1049" name="Equation" r:id="rId19" imgW="215900" imgH="215900" progId="Equation.3">
+                  <p:oleObj spid="_x0000_s1125" name="Equation" r:id="rId19" imgW="215900" imgH="215900" progId="Equation.3">
                     <p:embed/>
                   </p:oleObj>
                 </mc:Choice>
@@ -4911,7 +4804,7 @@
             <a:graphicData uri="http://schemas.openxmlformats.org/presentationml/2006/ole">
               <mc:AlternateContent xmlns:mc="http://schemas.openxmlformats.org/markup-compatibility/2006">
                 <mc:Choice xmlns:v="urn:schemas-microsoft-com:vml" Requires="v">
-                  <p:oleObj spid="_x0000_s1050" name="Equation" r:id="rId21" imgW="127000" imgH="203200" progId="Equation.3">
+                  <p:oleObj spid="_x0000_s1126" name="Equation" r:id="rId21" imgW="127000" imgH="203200" progId="Equation.3">
                     <p:embed/>
                   </p:oleObj>
                 </mc:Choice>
@@ -4968,7 +4861,7 @@
             <a:graphicData uri="http://schemas.openxmlformats.org/presentationml/2006/ole">
               <mc:AlternateContent xmlns:mc="http://schemas.openxmlformats.org/markup-compatibility/2006">
                 <mc:Choice xmlns:v="urn:schemas-microsoft-com:vml" Requires="v">
-                  <p:oleObj spid="_x0000_s1051" name="Equation" r:id="rId23" imgW="165100" imgH="215900" progId="Equation.3">
+                  <p:oleObj spid="_x0000_s1127" name="Equation" r:id="rId23" imgW="165100" imgH="215900" progId="Equation.3">
                     <p:embed/>
                   </p:oleObj>
                 </mc:Choice>
@@ -5003,80 +4896,6 @@
             </a:graphicData>
           </a:graphic>
         </p:graphicFrame>
-        <p:cxnSp>
-          <p:nvCxnSpPr>
-            <p:cNvPr id="135" name="Straight Connector 134"/>
-            <p:cNvCxnSpPr>
-              <a:endCxn id="17" idx="2"/>
-            </p:cNvCxnSpPr>
-            <p:nvPr/>
-          </p:nvCxnSpPr>
-          <p:spPr>
-            <a:xfrm flipV="1">
-              <a:off x="3288697" y="2295681"/>
-              <a:ext cx="1553402" cy="78254"/>
-            </a:xfrm>
-            <a:prstGeom prst="line">
-              <a:avLst/>
-            </a:prstGeom>
-            <a:ln w="12700" cmpd="sng">
-              <a:solidFill>
-                <a:schemeClr val="tx1"/>
-              </a:solidFill>
-            </a:ln>
-          </p:spPr>
-          <p:style>
-            <a:lnRef idx="2">
-              <a:schemeClr val="accent1"/>
-            </a:lnRef>
-            <a:fillRef idx="0">
-              <a:schemeClr val="accent1"/>
-            </a:fillRef>
-            <a:effectRef idx="1">
-              <a:schemeClr val="accent1"/>
-            </a:effectRef>
-            <a:fontRef idx="minor">
-              <a:schemeClr val="tx1"/>
-            </a:fontRef>
-          </p:style>
-        </p:cxnSp>
-        <p:cxnSp>
-          <p:nvCxnSpPr>
-            <p:cNvPr id="139" name="Straight Connector 138"/>
-            <p:cNvCxnSpPr>
-              <a:endCxn id="17" idx="3"/>
-            </p:cNvCxnSpPr>
-            <p:nvPr/>
-          </p:nvCxnSpPr>
-          <p:spPr>
-            <a:xfrm flipV="1">
-              <a:off x="4284131" y="2362670"/>
-              <a:ext cx="585082" cy="460964"/>
-            </a:xfrm>
-            <a:prstGeom prst="line">
-              <a:avLst/>
-            </a:prstGeom>
-            <a:ln w="12700" cmpd="sng">
-              <a:solidFill>
-                <a:schemeClr val="tx1"/>
-              </a:solidFill>
-            </a:ln>
-          </p:spPr>
-          <p:style>
-            <a:lnRef idx="2">
-              <a:schemeClr val="accent1"/>
-            </a:lnRef>
-            <a:fillRef idx="0">
-              <a:schemeClr val="accent1"/>
-            </a:fillRef>
-            <a:effectRef idx="1">
-              <a:schemeClr val="accent1"/>
-            </a:effectRef>
-            <a:fontRef idx="minor">
-              <a:schemeClr val="tx1"/>
-            </a:fontRef>
-          </p:style>
-        </p:cxnSp>
         <p:graphicFrame>
           <p:nvGraphicFramePr>
             <p:cNvPr id="145" name="Object 144"/>
@@ -5099,7 +4918,7 @@
             <a:graphicData uri="http://schemas.openxmlformats.org/presentationml/2006/ole">
               <mc:AlternateContent xmlns:mc="http://schemas.openxmlformats.org/markup-compatibility/2006">
                 <mc:Choice xmlns:v="urn:schemas-microsoft-com:vml" Requires="v">
-                  <p:oleObj spid="_x0000_s1052" name="Equation" r:id="rId25" imgW="215900" imgH="215900" progId="Equation.3">
+                  <p:oleObj spid="_x0000_s1128" name="Equation" r:id="rId25" imgW="215900" imgH="215900" progId="Equation.3">
                     <p:embed/>
                   </p:oleObj>
                 </mc:Choice>
@@ -5156,7 +4975,7 @@
             <a:graphicData uri="http://schemas.openxmlformats.org/presentationml/2006/ole">
               <mc:AlternateContent xmlns:mc="http://schemas.openxmlformats.org/markup-compatibility/2006">
                 <mc:Choice xmlns:v="urn:schemas-microsoft-com:vml" Requires="v">
-                  <p:oleObj spid="_x0000_s1053" name="Equation" r:id="rId27" imgW="203200" imgH="215900" progId="Equation.3">
+                  <p:oleObj spid="_x0000_s1129" name="Equation" r:id="rId27" imgW="203200" imgH="215900" progId="Equation.3">
                     <p:embed/>
                   </p:oleObj>
                 </mc:Choice>
@@ -5179,63 +4998,6 @@
                         <a:xfrm>
                           <a:off x="3953402" y="2879632"/>
                           <a:ext cx="342900" cy="358775"/>
-                        </a:xfrm>
-                        <a:prstGeom prst="rect">
-                          <a:avLst/>
-                        </a:prstGeom>
-                      </p:spPr>
-                    </p:pic>
-                  </p:oleObj>
-                </mc:Fallback>
-              </mc:AlternateContent>
-            </a:graphicData>
-          </a:graphic>
-        </p:graphicFrame>
-        <p:graphicFrame>
-          <p:nvGraphicFramePr>
-            <p:cNvPr id="147" name="Object 146"/>
-            <p:cNvGraphicFramePr>
-              <a:graphicFrameLocks noChangeAspect="1"/>
-            </p:cNvGraphicFramePr>
-            <p:nvPr>
-              <p:extLst>
-                <p:ext uri="{D42A27DB-BD31-4B8C-83A1-F6EECF244321}">
-                  <p14:modId xmlns:p14="http://schemas.microsoft.com/office/powerpoint/2010/main" val="2779558402"/>
-                </p:ext>
-              </p:extLst>
-            </p:nvPr>
-          </p:nvGraphicFramePr>
-          <p:xfrm>
-            <a:off x="4223041" y="2296509"/>
-            <a:ext cx="385763" cy="358775"/>
-          </p:xfrm>
-          <a:graphic>
-            <a:graphicData uri="http://schemas.openxmlformats.org/presentationml/2006/ole">
-              <mc:AlternateContent xmlns:mc="http://schemas.openxmlformats.org/markup-compatibility/2006">
-                <mc:Choice xmlns:v="urn:schemas-microsoft-com:vml" Requires="v">
-                  <p:oleObj spid="_x0000_s1054" name="Equation" r:id="rId29" imgW="228600" imgH="215900" progId="Equation.3">
-                    <p:embed/>
-                  </p:oleObj>
-                </mc:Choice>
-                <mc:Fallback>
-                  <p:oleObj name="Equation" r:id="rId29" imgW="228600" imgH="215900" progId="Equation.3">
-                    <p:embed/>
-                    <p:pic>
-                      <p:nvPicPr>
-                        <p:cNvPr id="0" name=""/>
-                        <p:cNvPicPr/>
-                        <p:nvPr/>
-                      </p:nvPicPr>
-                      <p:blipFill>
-                        <a:blip r:embed="rId30"/>
-                        <a:stretch>
-                          <a:fillRect/>
-                        </a:stretch>
-                      </p:blipFill>
-                      <p:spPr>
-                        <a:xfrm>
-                          <a:off x="4223041" y="2296509"/>
-                          <a:ext cx="385763" cy="358775"/>
                         </a:xfrm>
                         <a:prstGeom prst="rect">
                           <a:avLst/>
@@ -5306,12 +5068,12 @@
             <a:graphicData uri="http://schemas.openxmlformats.org/presentationml/2006/ole">
               <mc:AlternateContent xmlns:mc="http://schemas.openxmlformats.org/markup-compatibility/2006">
                 <mc:Choice xmlns:v="urn:schemas-microsoft-com:vml" Requires="v">
-                  <p:oleObj spid="_x0000_s1055" name="Equation" r:id="rId31" imgW="139700" imgH="241300" progId="Equation.3">
+                  <p:oleObj spid="_x0000_s1130" name="Equation" r:id="rId29" imgW="139700" imgH="241300" progId="Equation.3">
                     <p:embed/>
                   </p:oleObj>
                 </mc:Choice>
                 <mc:Fallback>
-                  <p:oleObj name="Equation" r:id="rId31" imgW="139700" imgH="241300" progId="Equation.3">
+                  <p:oleObj name="Equation" r:id="rId29" imgW="139700" imgH="241300" progId="Equation.3">
                     <p:embed/>
                     <p:pic>
                       <p:nvPicPr>
@@ -5320,7 +5082,7 @@
                         <p:nvPr/>
                       </p:nvPicPr>
                       <p:blipFill>
-                        <a:blip r:embed="rId32"/>
+                        <a:blip r:embed="rId30"/>
                         <a:stretch>
                           <a:fillRect/>
                         </a:stretch>
@@ -5436,12 +5198,12 @@
             <a:graphicData uri="http://schemas.openxmlformats.org/presentationml/2006/ole">
               <mc:AlternateContent xmlns:mc="http://schemas.openxmlformats.org/markup-compatibility/2006">
                 <mc:Choice xmlns:v="urn:schemas-microsoft-com:vml" Requires="v">
-                  <p:oleObj spid="_x0000_s1056" name="Equation" r:id="rId33" imgW="241300" imgH="228600" progId="Equation.3">
+                  <p:oleObj spid="_x0000_s1131" name="Equation" r:id="rId31" imgW="241300" imgH="228600" progId="Equation.3">
                     <p:embed/>
                   </p:oleObj>
                 </mc:Choice>
                 <mc:Fallback>
-                  <p:oleObj name="Equation" r:id="rId33" imgW="241300" imgH="228600" progId="Equation.3">
+                  <p:oleObj name="Equation" r:id="rId31" imgW="241300" imgH="228600" progId="Equation.3">
                     <p:embed/>
                     <p:pic>
                       <p:nvPicPr>
@@ -5450,7 +5212,7 @@
                         <p:nvPr/>
                       </p:nvPicPr>
                       <p:blipFill>
-                        <a:blip r:embed="rId34"/>
+                        <a:blip r:embed="rId32"/>
                         <a:stretch>
                           <a:fillRect/>
                         </a:stretch>
@@ -5472,6 +5234,417 @@
           </a:graphic>
         </p:graphicFrame>
       </p:grpSp>
+      <p:cxnSp>
+        <p:nvCxnSpPr>
+          <p:cNvPr id="57" name="Straight Connector 56">
+            <a:extLst>
+              <a:ext uri="{FF2B5EF4-FFF2-40B4-BE49-F238E27FC236}">
+                <a16:creationId xmlns:a16="http://schemas.microsoft.com/office/drawing/2014/main" id="{260E2756-FE50-F249-A729-4CD7DD6AEBFE}"/>
+              </a:ext>
+            </a:extLst>
+          </p:cNvPr>
+          <p:cNvCxnSpPr>
+            <a:cxnSpLocks/>
+          </p:cNvCxnSpPr>
+          <p:nvPr/>
+        </p:nvCxnSpPr>
+        <p:spPr>
+          <a:xfrm flipH="1">
+            <a:off x="3704681" y="1748146"/>
+            <a:ext cx="583954" cy="1088021"/>
+          </a:xfrm>
+          <a:prstGeom prst="line">
+            <a:avLst/>
+          </a:prstGeom>
+          <a:ln w="12700" cmpd="sng">
+            <a:solidFill>
+              <a:schemeClr val="tx1"/>
+            </a:solidFill>
+          </a:ln>
+        </p:spPr>
+        <p:style>
+          <a:lnRef idx="2">
+            <a:schemeClr val="accent1"/>
+          </a:lnRef>
+          <a:fillRef idx="0">
+            <a:schemeClr val="accent1"/>
+          </a:fillRef>
+          <a:effectRef idx="1">
+            <a:schemeClr val="accent1"/>
+          </a:effectRef>
+          <a:fontRef idx="minor">
+            <a:schemeClr val="tx1"/>
+          </a:fontRef>
+        </p:style>
+      </p:cxnSp>
+      <p:sp>
+        <p:nvSpPr>
+          <p:cNvPr id="56" name="Oval 55">
+            <a:extLst>
+              <a:ext uri="{FF2B5EF4-FFF2-40B4-BE49-F238E27FC236}">
+                <a16:creationId xmlns:a16="http://schemas.microsoft.com/office/drawing/2014/main" id="{0E2F480F-0DF3-3444-9BA1-98CE935192EC}"/>
+              </a:ext>
+            </a:extLst>
+          </p:cNvPr>
+          <p:cNvSpPr/>
+          <p:nvPr/>
+        </p:nvSpPr>
+        <p:spPr>
+          <a:xfrm>
+            <a:off x="4204760" y="1639415"/>
+            <a:ext cx="185149" cy="189475"/>
+          </a:xfrm>
+          <a:prstGeom prst="ellipse">
+            <a:avLst/>
+          </a:prstGeom>
+          <a:gradFill>
+            <a:gsLst>
+              <a:gs pos="0">
+                <a:schemeClr val="tx2"/>
+              </a:gs>
+              <a:gs pos="99000">
+                <a:schemeClr val="tx2"/>
+              </a:gs>
+            </a:gsLst>
+          </a:gradFill>
+        </p:spPr>
+        <p:style>
+          <a:lnRef idx="1">
+            <a:schemeClr val="accent2"/>
+          </a:lnRef>
+          <a:fillRef idx="3">
+            <a:schemeClr val="accent2"/>
+          </a:fillRef>
+          <a:effectRef idx="2">
+            <a:schemeClr val="accent2"/>
+          </a:effectRef>
+          <a:fontRef idx="minor">
+            <a:schemeClr val="lt1"/>
+          </a:fontRef>
+        </p:style>
+        <p:txBody>
+          <a:bodyPr rtlCol="0" anchor="ctr"/>
+          <a:lstStyle/>
+          <a:p>
+            <a:pPr algn="ctr"/>
+            <a:endParaRPr lang="en-US" dirty="0">
+              <a:solidFill>
+                <a:schemeClr val="tx1">
+                  <a:lumMod val="50000"/>
+                  <a:lumOff val="50000"/>
+                </a:schemeClr>
+              </a:solidFill>
+            </a:endParaRPr>
+          </a:p>
+        </p:txBody>
+      </p:sp>
+      <mc:AlternateContent xmlns:mc="http://schemas.openxmlformats.org/markup-compatibility/2006">
+        <mc:Choice xmlns:a14="http://schemas.microsoft.com/office/drawing/2010/main" Requires="a14">
+          <p:sp>
+            <p:nvSpPr>
+              <p:cNvPr id="4" name="TextBox 3">
+                <a:extLst>
+                  <a:ext uri="{FF2B5EF4-FFF2-40B4-BE49-F238E27FC236}">
+                    <a16:creationId xmlns:a16="http://schemas.microsoft.com/office/drawing/2014/main" id="{E82AF490-653A-0C42-B0D9-330FE616536A}"/>
+                  </a:ext>
+                </a:extLst>
+              </p:cNvPr>
+              <p:cNvSpPr txBox="1"/>
+              <p:nvPr/>
+            </p:nvSpPr>
+            <p:spPr>
+              <a:xfrm>
+                <a:off x="3704745" y="1605374"/>
+                <a:ext cx="492955" cy="276999"/>
+              </a:xfrm>
+              <a:prstGeom prst="rect">
+                <a:avLst/>
+              </a:prstGeom>
+              <a:noFill/>
+            </p:spPr>
+            <p:txBody>
+              <a:bodyPr wrap="none" lIns="0" tIns="0" rIns="0" bIns="0" rtlCol="0">
+                <a:spAutoFit/>
+              </a:bodyPr>
+              <a:lstStyle/>
+              <a:p>
+                <a14:m>
+                  <m:oMathPara xmlns:m="http://schemas.openxmlformats.org/officeDocument/2006/math">
+                    <m:oMathParaPr>
+                      <m:jc m:val="centerGroup"/>
+                    </m:oMathParaPr>
+                    <m:oMath xmlns:m="http://schemas.openxmlformats.org/officeDocument/2006/math">
+                      <m:sSub>
+                        <m:sSubPr>
+                          <m:ctrlPr>
+                            <a:rPr lang="en-US" b="1" i="1" smtClean="0">
+                              <a:latin typeface="Cambria Math" panose="02040503050406030204" pitchFamily="18" charset="0"/>
+                            </a:rPr>
+                          </m:ctrlPr>
+                        </m:sSubPr>
+                        <m:e>
+                          <m:r>
+                            <a:rPr lang="en-US" b="1" i="0" baseline="0" smtClean="0">
+                              <a:latin typeface="Cambria Math" panose="02040503050406030204" pitchFamily="18" charset="0"/>
+                            </a:rPr>
+                            <m:t>𝐱</m:t>
+                          </m:r>
+                        </m:e>
+                        <m:sub>
+                          <m:r>
+                            <a:rPr lang="en-US" b="0" i="1" smtClean="0">
+                              <a:latin typeface="Cambria Math" panose="02040503050406030204" pitchFamily="18" charset="0"/>
+                            </a:rPr>
+                            <m:t>𝐸𝑐</m:t>
+                          </m:r>
+                          <m:r>
+                            <a:rPr lang="en-US" b="0" i="1" smtClean="0">
+                              <a:latin typeface="Cambria Math" panose="02040503050406030204" pitchFamily="18" charset="0"/>
+                            </a:rPr>
+                            <m:t>1</m:t>
+                          </m:r>
+                        </m:sub>
+                      </m:sSub>
+                    </m:oMath>
+                  </m:oMathPara>
+                </a14:m>
+                <a:endParaRPr lang="en-US" b="1" dirty="0">
+                  <a:latin typeface="Times New Roman" panose="02020603050405020304" pitchFamily="18" charset="0"/>
+                  <a:cs typeface="Times New Roman" panose="02020603050405020304" pitchFamily="18" charset="0"/>
+                </a:endParaRPr>
+              </a:p>
+            </p:txBody>
+          </p:sp>
+        </mc:Choice>
+        <mc:Fallback>
+          <p:sp>
+            <p:nvSpPr>
+              <p:cNvPr id="4" name="TextBox 3">
+                <a:extLst>
+                  <a:ext uri="{FF2B5EF4-FFF2-40B4-BE49-F238E27FC236}">
+                    <a16:creationId xmlns:a16="http://schemas.microsoft.com/office/drawing/2014/main" id="{E82AF490-653A-0C42-B0D9-330FE616536A}"/>
+                  </a:ext>
+                </a:extLst>
+              </p:cNvPr>
+              <p:cNvSpPr txBox="1">
+                <a:spLocks noRot="1" noChangeAspect="1" noMove="1" noResize="1" noEditPoints="1" noAdjustHandles="1" noChangeArrowheads="1" noChangeShapeType="1" noTextEdit="1"/>
+              </p:cNvSpPr>
+              <p:nvPr/>
+            </p:nvSpPr>
+            <p:spPr>
+              <a:xfrm>
+                <a:off x="3704745" y="1605374"/>
+                <a:ext cx="492955" cy="276999"/>
+              </a:xfrm>
+              <a:prstGeom prst="rect">
+                <a:avLst/>
+              </a:prstGeom>
+              <a:blipFill>
+                <a:blip r:embed="rId33"/>
+                <a:stretch>
+                  <a:fillRect l="-5000" r="-2500" b="-13043"/>
+                </a:stretch>
+              </a:blipFill>
+            </p:spPr>
+            <p:txBody>
+              <a:bodyPr/>
+              <a:lstStyle/>
+              <a:p>
+                <a:r>
+                  <a:rPr lang="en-US">
+                    <a:noFill/>
+                  </a:rPr>
+                  <a:t> </a:t>
+                </a:r>
+              </a:p>
+            </p:txBody>
+          </p:sp>
+        </mc:Fallback>
+      </mc:AlternateContent>
+      <p:cxnSp>
+        <p:nvCxnSpPr>
+          <p:cNvPr id="62" name="Straight Connector 61">
+            <a:extLst>
+              <a:ext uri="{FF2B5EF4-FFF2-40B4-BE49-F238E27FC236}">
+                <a16:creationId xmlns:a16="http://schemas.microsoft.com/office/drawing/2014/main" id="{95A11CFE-27A8-B749-865A-A29030D06C9C}"/>
+              </a:ext>
+            </a:extLst>
+          </p:cNvPr>
+          <p:cNvCxnSpPr>
+            <a:cxnSpLocks/>
+            <a:stCxn id="56" idx="5"/>
+          </p:cNvCxnSpPr>
+          <p:nvPr/>
+        </p:nvCxnSpPr>
+        <p:spPr>
+          <a:xfrm>
+            <a:off x="4362795" y="1801142"/>
+            <a:ext cx="229991" cy="129598"/>
+          </a:xfrm>
+          <a:prstGeom prst="line">
+            <a:avLst/>
+          </a:prstGeom>
+          <a:ln w="12700" cmpd="sng">
+            <a:solidFill>
+              <a:schemeClr val="tx1"/>
+            </a:solidFill>
+          </a:ln>
+        </p:spPr>
+        <p:style>
+          <a:lnRef idx="2">
+            <a:schemeClr val="accent1"/>
+          </a:lnRef>
+          <a:fillRef idx="0">
+            <a:schemeClr val="accent1"/>
+          </a:fillRef>
+          <a:effectRef idx="1">
+            <a:schemeClr val="accent1"/>
+          </a:effectRef>
+          <a:fontRef idx="minor">
+            <a:schemeClr val="tx1"/>
+          </a:fontRef>
+        </p:style>
+      </p:cxnSp>
+      <p:cxnSp>
+        <p:nvCxnSpPr>
+          <p:cNvPr id="65" name="Straight Connector 64">
+            <a:extLst>
+              <a:ext uri="{FF2B5EF4-FFF2-40B4-BE49-F238E27FC236}">
+                <a16:creationId xmlns:a16="http://schemas.microsoft.com/office/drawing/2014/main" id="{EC653D3A-30B4-C341-9F3B-291A943A11BE}"/>
+              </a:ext>
+            </a:extLst>
+          </p:cNvPr>
+          <p:cNvCxnSpPr>
+            <a:cxnSpLocks/>
+          </p:cNvCxnSpPr>
+          <p:nvPr/>
+        </p:nvCxnSpPr>
+        <p:spPr>
+          <a:xfrm flipH="1">
+            <a:off x="3951261" y="1909873"/>
+            <a:ext cx="583954" cy="1088021"/>
+          </a:xfrm>
+          <a:prstGeom prst="line">
+            <a:avLst/>
+          </a:prstGeom>
+          <a:ln w="12700" cmpd="sng">
+            <a:solidFill>
+              <a:schemeClr val="tx1"/>
+            </a:solidFill>
+            <a:headEnd type="triangle"/>
+            <a:tailEnd type="triangle"/>
+          </a:ln>
+        </p:spPr>
+        <p:style>
+          <a:lnRef idx="2">
+            <a:schemeClr val="accent1"/>
+          </a:lnRef>
+          <a:fillRef idx="0">
+            <a:schemeClr val="accent1"/>
+          </a:fillRef>
+          <a:effectRef idx="1">
+            <a:schemeClr val="accent1"/>
+          </a:effectRef>
+          <a:fontRef idx="minor">
+            <a:schemeClr val="tx1"/>
+          </a:fontRef>
+        </p:style>
+      </p:cxnSp>
+      <mc:AlternateContent xmlns:mc="http://schemas.openxmlformats.org/markup-compatibility/2006">
+        <mc:Choice xmlns:a14="http://schemas.microsoft.com/office/drawing/2010/main" Requires="a14">
+          <p:sp>
+            <p:nvSpPr>
+              <p:cNvPr id="7" name="TextBox 6">
+                <a:extLst>
+                  <a:ext uri="{FF2B5EF4-FFF2-40B4-BE49-F238E27FC236}">
+                    <a16:creationId xmlns:a16="http://schemas.microsoft.com/office/drawing/2014/main" id="{3193741D-68EE-1E49-BCB1-9FCE7B0AD56B}"/>
+                  </a:ext>
+                </a:extLst>
+              </p:cNvPr>
+              <p:cNvSpPr txBox="1"/>
+              <p:nvPr/>
+            </p:nvSpPr>
+            <p:spPr>
+              <a:xfrm>
+                <a:off x="4272940" y="2418694"/>
+                <a:ext cx="185114" cy="276999"/>
+              </a:xfrm>
+              <a:prstGeom prst="rect">
+                <a:avLst/>
+              </a:prstGeom>
+              <a:noFill/>
+            </p:spPr>
+            <p:txBody>
+              <a:bodyPr wrap="none" lIns="0" tIns="0" rIns="0" bIns="0" rtlCol="0">
+                <a:spAutoFit/>
+              </a:bodyPr>
+              <a:lstStyle/>
+              <a:p>
+                <a14:m>
+                  <m:oMathPara xmlns:m="http://schemas.openxmlformats.org/officeDocument/2006/math">
+                    <m:oMathParaPr>
+                      <m:jc m:val="centerGroup"/>
+                    </m:oMathParaPr>
+                    <m:oMath xmlns:m="http://schemas.openxmlformats.org/officeDocument/2006/math">
+                      <m:r>
+                        <a:rPr lang="en-US" b="0" i="1" smtClean="0">
+                          <a:latin typeface="Cambria Math" panose="02040503050406030204" pitchFamily="18" charset="0"/>
+                        </a:rPr>
+                        <m:t>h</m:t>
+                      </m:r>
+                    </m:oMath>
+                  </m:oMathPara>
+                </a14:m>
+                <a:endParaRPr lang="en-US" dirty="0"/>
+              </a:p>
+            </p:txBody>
+          </p:sp>
+        </mc:Choice>
+        <mc:Fallback>
+          <p:sp>
+            <p:nvSpPr>
+              <p:cNvPr id="7" name="TextBox 6">
+                <a:extLst>
+                  <a:ext uri="{FF2B5EF4-FFF2-40B4-BE49-F238E27FC236}">
+                    <a16:creationId xmlns:a16="http://schemas.microsoft.com/office/drawing/2014/main" id="{3193741D-68EE-1E49-BCB1-9FCE7B0AD56B}"/>
+                  </a:ext>
+                </a:extLst>
+              </p:cNvPr>
+              <p:cNvSpPr txBox="1">
+                <a:spLocks noRot="1" noChangeAspect="1" noMove="1" noResize="1" noEditPoints="1" noAdjustHandles="1" noChangeArrowheads="1" noChangeShapeType="1" noTextEdit="1"/>
+              </p:cNvSpPr>
+              <p:nvPr/>
+            </p:nvSpPr>
+            <p:spPr>
+              <a:xfrm>
+                <a:off x="4272940" y="2418694"/>
+                <a:ext cx="185114" cy="276999"/>
+              </a:xfrm>
+              <a:prstGeom prst="rect">
+                <a:avLst/>
+              </a:prstGeom>
+              <a:blipFill>
+                <a:blip r:embed="rId34"/>
+                <a:stretch>
+                  <a:fillRect l="-33333" r="-33333" b="-8696"/>
+                </a:stretch>
+              </a:blipFill>
+            </p:spPr>
+            <p:txBody>
+              <a:bodyPr/>
+              <a:lstStyle/>
+              <a:p>
+                <a:r>
+                  <a:rPr lang="en-US">
+                    <a:noFill/>
+                  </a:rPr>
+                  <a:t> </a:t>
+                </a:r>
+              </a:p>
+            </p:txBody>
+          </p:sp>
+        </mc:Fallback>
+      </mc:AlternateContent>
     </p:spTree>
     <p:extLst>
       <p:ext uri="{BB962C8B-B14F-4D97-AF65-F5344CB8AC3E}">

</xml_diff>